<commit_message>
adicao de verificacao de mais exames dentro do HEMOGRAMA
plaquetas_valor_float < 20000.0 or plaquetas_valor_float > 1000000.0: # /uL
leucocitos_valor_float < 2000.0 or leucocitos_valor_float > 50000.0: # /µL
hematocrito_valor_float < 18.0 or hematocrito_valor_float > 60.0: # vol%
hemoglobina_valor_float < 6.6 or hemoglobina_valor_float > 19.9:
</commit_message>
<xml_diff>
--- a/HSF - OLHO DE DEUS.pptx
+++ b/HSF - OLHO DE DEUS.pptx
@@ -260,7 +260,7 @@
           <a:p>
             <a:fld id="{F3394602-FD07-7047-86E9-5205F8BAB373}" type="datetimeFigureOut">
               <a:rPr lang="pt-BR" smtClean="0"/>
-              <a:t>03/06/2025</a:t>
+              <a:t>12/06/2025</a:t>
             </a:fld>
             <a:endParaRPr lang="pt-BR"/>
           </a:p>
@@ -458,7 +458,7 @@
           <a:p>
             <a:fld id="{F3394602-FD07-7047-86E9-5205F8BAB373}" type="datetimeFigureOut">
               <a:rPr lang="pt-BR" smtClean="0"/>
-              <a:t>03/06/2025</a:t>
+              <a:t>12/06/2025</a:t>
             </a:fld>
             <a:endParaRPr lang="pt-BR"/>
           </a:p>
@@ -666,7 +666,7 @@
           <a:p>
             <a:fld id="{F3394602-FD07-7047-86E9-5205F8BAB373}" type="datetimeFigureOut">
               <a:rPr lang="pt-BR" smtClean="0"/>
-              <a:t>03/06/2025</a:t>
+              <a:t>12/06/2025</a:t>
             </a:fld>
             <a:endParaRPr lang="pt-BR"/>
           </a:p>
@@ -864,7 +864,7 @@
           <a:p>
             <a:fld id="{F3394602-FD07-7047-86E9-5205F8BAB373}" type="datetimeFigureOut">
               <a:rPr lang="pt-BR" smtClean="0"/>
-              <a:t>03/06/2025</a:t>
+              <a:t>12/06/2025</a:t>
             </a:fld>
             <a:endParaRPr lang="pt-BR"/>
           </a:p>
@@ -1139,7 +1139,7 @@
           <a:p>
             <a:fld id="{F3394602-FD07-7047-86E9-5205F8BAB373}" type="datetimeFigureOut">
               <a:rPr lang="pt-BR" smtClean="0"/>
-              <a:t>03/06/2025</a:t>
+              <a:t>12/06/2025</a:t>
             </a:fld>
             <a:endParaRPr lang="pt-BR"/>
           </a:p>
@@ -1404,7 +1404,7 @@
           <a:p>
             <a:fld id="{F3394602-FD07-7047-86E9-5205F8BAB373}" type="datetimeFigureOut">
               <a:rPr lang="pt-BR" smtClean="0"/>
-              <a:t>03/06/2025</a:t>
+              <a:t>12/06/2025</a:t>
             </a:fld>
             <a:endParaRPr lang="pt-BR"/>
           </a:p>
@@ -1816,7 +1816,7 @@
           <a:p>
             <a:fld id="{F3394602-FD07-7047-86E9-5205F8BAB373}" type="datetimeFigureOut">
               <a:rPr lang="pt-BR" smtClean="0"/>
-              <a:t>03/06/2025</a:t>
+              <a:t>12/06/2025</a:t>
             </a:fld>
             <a:endParaRPr lang="pt-BR"/>
           </a:p>
@@ -1957,7 +1957,7 @@
           <a:p>
             <a:fld id="{F3394602-FD07-7047-86E9-5205F8BAB373}" type="datetimeFigureOut">
               <a:rPr lang="pt-BR" smtClean="0"/>
-              <a:t>03/06/2025</a:t>
+              <a:t>12/06/2025</a:t>
             </a:fld>
             <a:endParaRPr lang="pt-BR"/>
           </a:p>
@@ -2070,7 +2070,7 @@
           <a:p>
             <a:fld id="{F3394602-FD07-7047-86E9-5205F8BAB373}" type="datetimeFigureOut">
               <a:rPr lang="pt-BR" smtClean="0"/>
-              <a:t>03/06/2025</a:t>
+              <a:t>12/06/2025</a:t>
             </a:fld>
             <a:endParaRPr lang="pt-BR"/>
           </a:p>
@@ -2381,7 +2381,7 @@
           <a:p>
             <a:fld id="{F3394602-FD07-7047-86E9-5205F8BAB373}" type="datetimeFigureOut">
               <a:rPr lang="pt-BR" smtClean="0"/>
-              <a:t>03/06/2025</a:t>
+              <a:t>12/06/2025</a:t>
             </a:fld>
             <a:endParaRPr lang="pt-BR"/>
           </a:p>
@@ -2669,7 +2669,7 @@
           <a:p>
             <a:fld id="{F3394602-FD07-7047-86E9-5205F8BAB373}" type="datetimeFigureOut">
               <a:rPr lang="pt-BR" smtClean="0"/>
-              <a:t>03/06/2025</a:t>
+              <a:t>12/06/2025</a:t>
             </a:fld>
             <a:endParaRPr lang="pt-BR"/>
           </a:p>
@@ -2910,7 +2910,7 @@
           <a:p>
             <a:fld id="{F3394602-FD07-7047-86E9-5205F8BAB373}" type="datetimeFigureOut">
               <a:rPr lang="pt-BR" smtClean="0"/>
-              <a:t>03/06/2025</a:t>
+              <a:t>12/06/2025</a:t>
             </a:fld>
             <a:endParaRPr lang="pt-BR"/>
           </a:p>
@@ -4538,58 +4538,6 @@
       </p:sp>
       <p:sp>
         <p:nvSpPr>
-          <p:cNvPr id="18" name="Elipse 17">
-            <a:extLst>
-              <a:ext uri="{FF2B5EF4-FFF2-40B4-BE49-F238E27FC236}">
-                <a16:creationId xmlns:a16="http://schemas.microsoft.com/office/drawing/2014/main" id="{816CFE4E-7825-1A9E-BD77-C70FF66EA260}"/>
-              </a:ext>
-            </a:extLst>
-          </p:cNvPr>
-          <p:cNvSpPr/>
-          <p:nvPr/>
-        </p:nvSpPr>
-        <p:spPr>
-          <a:xfrm>
-            <a:off x="11060683" y="2572712"/>
-            <a:ext cx="935919" cy="1025934"/>
-          </a:xfrm>
-          <a:prstGeom prst="ellipse">
-            <a:avLst/>
-          </a:prstGeom>
-          <a:solidFill>
-            <a:srgbClr val="C00000"/>
-          </a:solidFill>
-        </p:spPr>
-        <p:style>
-          <a:lnRef idx="2">
-            <a:schemeClr val="accent1">
-              <a:shade val="15000"/>
-            </a:schemeClr>
-          </a:lnRef>
-          <a:fillRef idx="1">
-            <a:schemeClr val="accent1"/>
-          </a:fillRef>
-          <a:effectRef idx="0">
-            <a:schemeClr val="accent1"/>
-          </a:effectRef>
-          <a:fontRef idx="minor">
-            <a:schemeClr val="lt1"/>
-          </a:fontRef>
-        </p:style>
-        <p:txBody>
-          <a:bodyPr rtlCol="0" anchor="ctr"/>
-          <a:lstStyle/>
-          <a:p>
-            <a:pPr algn="ctr"/>
-            <a:r>
-              <a:rPr lang="pt-BR" sz="800" dirty="0"/>
-              <a:t>FIM</a:t>
-            </a:r>
-          </a:p>
-        </p:txBody>
-      </p:sp>
-      <p:sp>
-        <p:nvSpPr>
           <p:cNvPr id="6" name="Retângulo 5">
             <a:extLst>
               <a:ext uri="{FF2B5EF4-FFF2-40B4-BE49-F238E27FC236}">
@@ -4792,49 +4740,6 @@
       </p:sp>
       <p:cxnSp>
         <p:nvCxnSpPr>
-          <p:cNvPr id="89" name="Conector de Seta Reta 88">
-            <a:extLst>
-              <a:ext uri="{FF2B5EF4-FFF2-40B4-BE49-F238E27FC236}">
-                <a16:creationId xmlns:a16="http://schemas.microsoft.com/office/drawing/2014/main" id="{2C7F50B3-1097-C065-E186-0082669569EE}"/>
-              </a:ext>
-            </a:extLst>
-          </p:cNvPr>
-          <p:cNvCxnSpPr>
-            <a:cxnSpLocks/>
-            <a:stCxn id="11" idx="5"/>
-            <a:endCxn id="42" idx="1"/>
-          </p:cNvCxnSpPr>
-          <p:nvPr/>
-        </p:nvCxnSpPr>
-        <p:spPr>
-          <a:xfrm flipV="1">
-            <a:off x="5895590" y="2711967"/>
-            <a:ext cx="1108682" cy="2591"/>
-          </a:xfrm>
-          <a:prstGeom prst="straightConnector1">
-            <a:avLst/>
-          </a:prstGeom>
-          <a:ln>
-            <a:tailEnd type="triangle"/>
-          </a:ln>
-        </p:spPr>
-        <p:style>
-          <a:lnRef idx="2">
-            <a:schemeClr val="accent1"/>
-          </a:lnRef>
-          <a:fillRef idx="0">
-            <a:schemeClr val="accent1"/>
-          </a:fillRef>
-          <a:effectRef idx="1">
-            <a:schemeClr val="accent1"/>
-          </a:effectRef>
-          <a:fontRef idx="minor">
-            <a:schemeClr val="tx1"/>
-          </a:fontRef>
-        </p:style>
-      </p:cxnSp>
-      <p:cxnSp>
-        <p:nvCxnSpPr>
           <p:cNvPr id="97" name="Conector: Angulado 96">
             <a:extLst>
               <a:ext uri="{FF2B5EF4-FFF2-40B4-BE49-F238E27FC236}">
@@ -4851,8 +4756,8 @@
         </p:nvCxnSpPr>
         <p:spPr>
           <a:xfrm rot="5400000">
-            <a:off x="4621286" y="3179545"/>
-            <a:ext cx="1292037" cy="921480"/>
+            <a:off x="5308893" y="3290926"/>
+            <a:ext cx="715810" cy="122493"/>
           </a:xfrm>
           <a:prstGeom prst="bentConnector3">
             <a:avLst>
@@ -5035,7 +4940,71 @@
         </p:nvSpPr>
         <p:spPr>
           <a:xfrm>
-            <a:off x="7004272" y="2340846"/>
+            <a:off x="8516824" y="3706865"/>
+            <a:ext cx="1144967" cy="742242"/>
+          </a:xfrm>
+          <a:prstGeom prst="roundRect">
+            <a:avLst/>
+          </a:prstGeom>
+          <a:solidFill>
+            <a:schemeClr val="bg1"/>
+          </a:solidFill>
+          <a:ln>
+            <a:solidFill>
+              <a:schemeClr val="accent6">
+                <a:lumMod val="50000"/>
+              </a:schemeClr>
+            </a:solidFill>
+          </a:ln>
+        </p:spPr>
+        <p:style>
+          <a:lnRef idx="2">
+            <a:schemeClr val="accent1">
+              <a:shade val="15000"/>
+            </a:schemeClr>
+          </a:lnRef>
+          <a:fillRef idx="1">
+            <a:schemeClr val="accent1"/>
+          </a:fillRef>
+          <a:effectRef idx="0">
+            <a:schemeClr val="accent1"/>
+          </a:effectRef>
+          <a:fontRef idx="minor">
+            <a:schemeClr val="lt1"/>
+          </a:fontRef>
+        </p:style>
+        <p:txBody>
+          <a:bodyPr rtlCol="0" anchor="ctr"/>
+          <a:lstStyle/>
+          <a:p>
+            <a:pPr algn="ctr"/>
+            <a:r>
+              <a:rPr lang="pt-BR" sz="1000" dirty="0">
+                <a:solidFill>
+                  <a:schemeClr val="tx1"/>
+                </a:solidFill>
+                <a:latin typeface="Calibri" panose="020F0502020204030204" pitchFamily="34" charset="0"/>
+              </a:rPr>
+              <a:t>Enviar whatsapp com dados obtidos</a:t>
+            </a:r>
+          </a:p>
+        </p:txBody>
+      </p:sp>
+      <p:sp>
+        <p:nvSpPr>
+          <p:cNvPr id="45" name="Retângulo: Cantos Arredondados 44">
+            <a:extLst>
+              <a:ext uri="{FF2B5EF4-FFF2-40B4-BE49-F238E27FC236}">
+                <a16:creationId xmlns:a16="http://schemas.microsoft.com/office/drawing/2014/main" id="{F067ACB2-0D7B-6394-FCA1-46BD62D1650E}"/>
+              </a:ext>
+            </a:extLst>
+          </p:cNvPr>
+          <p:cNvSpPr/>
+          <p:nvPr/>
+        </p:nvSpPr>
+        <p:spPr>
+          <a:xfrm>
+            <a:off x="5033067" y="3710077"/>
             <a:ext cx="1144967" cy="742242"/>
           </a:xfrm>
           <a:prstGeom prst="roundRect">
@@ -5078,17 +5047,105 @@
                 </a:solidFill>
                 <a:latin typeface="Calibri" panose="020F0502020204030204" pitchFamily="34" charset="0"/>
               </a:rPr>
-              <a:t>Enviar whatsapp com dados obtidos</a:t>
-            </a:r>
-          </a:p>
-        </p:txBody>
-      </p:sp>
-      <p:sp>
-        <p:nvSpPr>
-          <p:cNvPr id="45" name="Retângulo: Cantos Arredondados 44">
-            <a:extLst>
-              <a:ext uri="{FF2B5EF4-FFF2-40B4-BE49-F238E27FC236}">
-                <a16:creationId xmlns:a16="http://schemas.microsoft.com/office/drawing/2014/main" id="{F067ACB2-0D7B-6394-FCA1-46BD62D1650E}"/>
+              <a:t>Aguardar 58 minutos</a:t>
+            </a:r>
+          </a:p>
+        </p:txBody>
+      </p:sp>
+      <p:cxnSp>
+        <p:nvCxnSpPr>
+          <p:cNvPr id="48" name="Conector: Angulado 47">
+            <a:extLst>
+              <a:ext uri="{FF2B5EF4-FFF2-40B4-BE49-F238E27FC236}">
+                <a16:creationId xmlns:a16="http://schemas.microsoft.com/office/drawing/2014/main" id="{731B7D95-9B62-C228-D08E-B8392D469D1C}"/>
+              </a:ext>
+            </a:extLst>
+          </p:cNvPr>
+          <p:cNvCxnSpPr>
+            <a:cxnSpLocks/>
+            <a:stCxn id="45" idx="1"/>
+            <a:endCxn id="24" idx="2"/>
+          </p:cNvCxnSpPr>
+          <p:nvPr/>
+        </p:nvCxnSpPr>
+        <p:spPr>
+          <a:xfrm rot="10800000">
+            <a:off x="3501909" y="3083088"/>
+            <a:ext cx="1531159" cy="998110"/>
+          </a:xfrm>
+          <a:prstGeom prst="bentConnector2">
+            <a:avLst/>
+          </a:prstGeom>
+          <a:ln>
+            <a:tailEnd type="triangle"/>
+          </a:ln>
+        </p:spPr>
+        <p:style>
+          <a:lnRef idx="2">
+            <a:schemeClr val="accent1"/>
+          </a:lnRef>
+          <a:fillRef idx="0">
+            <a:schemeClr val="accent1"/>
+          </a:fillRef>
+          <a:effectRef idx="1">
+            <a:schemeClr val="accent1"/>
+          </a:effectRef>
+          <a:fontRef idx="minor">
+            <a:schemeClr val="tx1"/>
+          </a:fontRef>
+        </p:style>
+      </p:cxnSp>
+      <p:cxnSp>
+        <p:nvCxnSpPr>
+          <p:cNvPr id="59" name="Conector: Angulado 58">
+            <a:extLst>
+              <a:ext uri="{FF2B5EF4-FFF2-40B4-BE49-F238E27FC236}">
+                <a16:creationId xmlns:a16="http://schemas.microsoft.com/office/drawing/2014/main" id="{42BE5A8A-3A85-937E-CC9E-9C3EAD0F780F}"/>
+              </a:ext>
+            </a:extLst>
+          </p:cNvPr>
+          <p:cNvCxnSpPr>
+            <a:cxnSpLocks/>
+            <a:stCxn id="4" idx="6"/>
+            <a:endCxn id="24" idx="1"/>
+          </p:cNvCxnSpPr>
+          <p:nvPr/>
+        </p:nvCxnSpPr>
+        <p:spPr>
+          <a:xfrm flipV="1">
+            <a:off x="1086047" y="2711967"/>
+            <a:ext cx="1843377" cy="371121"/>
+          </a:xfrm>
+          <a:prstGeom prst="bentConnector3">
+            <a:avLst>
+              <a:gd name="adj1" fmla="val 50000"/>
+            </a:avLst>
+          </a:prstGeom>
+          <a:ln>
+            <a:tailEnd type="triangle"/>
+          </a:ln>
+        </p:spPr>
+        <p:style>
+          <a:lnRef idx="2">
+            <a:schemeClr val="accent1"/>
+          </a:lnRef>
+          <a:fillRef idx="0">
+            <a:schemeClr val="accent1"/>
+          </a:fillRef>
+          <a:effectRef idx="1">
+            <a:schemeClr val="accent1"/>
+          </a:effectRef>
+          <a:fontRef idx="minor">
+            <a:schemeClr val="tx1"/>
+          </a:fontRef>
+        </p:style>
+      </p:cxnSp>
+      <p:sp>
+        <p:nvSpPr>
+          <p:cNvPr id="9" name="Retângulo: Cantos Arredondados 8">
+            <a:extLst>
+              <a:ext uri="{FF2B5EF4-FFF2-40B4-BE49-F238E27FC236}">
+                <a16:creationId xmlns:a16="http://schemas.microsoft.com/office/drawing/2014/main" id="{CB721987-CD3A-C92C-80B5-F967AAE9C317}"/>
               </a:ext>
             </a:extLst>
           </p:cNvPr>
@@ -5097,7 +5154,7 @@
         </p:nvSpPr>
         <p:spPr>
           <a:xfrm>
-            <a:off x="4234080" y="4286304"/>
+            <a:off x="2929425" y="4823441"/>
             <a:ext cx="1144967" cy="742242"/>
           </a:xfrm>
           <a:prstGeom prst="roundRect">
@@ -5140,34 +5197,127 @@
                 </a:solidFill>
                 <a:latin typeface="Calibri" panose="020F0502020204030204" pitchFamily="34" charset="0"/>
               </a:rPr>
-              <a:t>Aguardar 5 minutos</a:t>
+              <a:t>Execução de Query para Obter resultados de Hemogramas</a:t>
+            </a:r>
+          </a:p>
+        </p:txBody>
+      </p:sp>
+      <p:sp>
+        <p:nvSpPr>
+          <p:cNvPr id="27" name="Triângulo isósceles 26">
+            <a:extLst>
+              <a:ext uri="{FF2B5EF4-FFF2-40B4-BE49-F238E27FC236}">
+                <a16:creationId xmlns:a16="http://schemas.microsoft.com/office/drawing/2014/main" id="{CCD353C7-8FF6-971A-4BBB-8D0D84BB326D}"/>
+              </a:ext>
+            </a:extLst>
+          </p:cNvPr>
+          <p:cNvSpPr/>
+          <p:nvPr/>
+        </p:nvSpPr>
+        <p:spPr>
+          <a:xfrm>
+            <a:off x="5247584" y="5268435"/>
+            <a:ext cx="670184" cy="559419"/>
+          </a:xfrm>
+          <a:prstGeom prst="triangle">
+            <a:avLst/>
+          </a:prstGeom>
+          <a:solidFill>
+            <a:schemeClr val="tx2">
+              <a:lumMod val="90000"/>
+              <a:lumOff val="10000"/>
+            </a:schemeClr>
+          </a:solidFill>
+        </p:spPr>
+        <p:style>
+          <a:lnRef idx="2">
+            <a:schemeClr val="accent1">
+              <a:shade val="15000"/>
+            </a:schemeClr>
+          </a:lnRef>
+          <a:fillRef idx="1">
+            <a:schemeClr val="accent1"/>
+          </a:fillRef>
+          <a:effectRef idx="0">
+            <a:schemeClr val="accent1"/>
+          </a:effectRef>
+          <a:fontRef idx="minor">
+            <a:schemeClr val="lt1"/>
+          </a:fontRef>
+        </p:style>
+        <p:txBody>
+          <a:bodyPr rtlCol="0" anchor="ctr"/>
+          <a:lstStyle/>
+          <a:p>
+            <a:pPr algn="ctr"/>
+            <a:endParaRPr lang="pt-BR"/>
+          </a:p>
+        </p:txBody>
+      </p:sp>
+      <p:sp>
+        <p:nvSpPr>
+          <p:cNvPr id="28" name="CaixaDeTexto 27">
+            <a:extLst>
+              <a:ext uri="{FF2B5EF4-FFF2-40B4-BE49-F238E27FC236}">
+                <a16:creationId xmlns:a16="http://schemas.microsoft.com/office/drawing/2014/main" id="{4C0F95D9-1449-74C7-4989-F42092B6CCCF}"/>
+              </a:ext>
+            </a:extLst>
+          </p:cNvPr>
+          <p:cNvSpPr txBox="1"/>
+          <p:nvPr/>
+        </p:nvSpPr>
+        <p:spPr>
+          <a:xfrm>
+            <a:off x="5096865" y="5046383"/>
+            <a:ext cx="993219" cy="230832"/>
+          </a:xfrm>
+          <a:prstGeom prst="rect">
+            <a:avLst/>
+          </a:prstGeom>
+          <a:noFill/>
+        </p:spPr>
+        <p:txBody>
+          <a:bodyPr wrap="square" rtlCol="0">
+            <a:spAutoFit/>
+          </a:bodyPr>
+          <a:lstStyle/>
+          <a:p>
+            <a:pPr algn="ctr"/>
+            <a:r>
+              <a:rPr lang="pt-BR" sz="900" dirty="0">
+                <a:latin typeface="Calibri" panose="020F0502020204030204" pitchFamily="34" charset="0"/>
+              </a:rPr>
+              <a:t>É valor crítico?</a:t>
             </a:r>
           </a:p>
         </p:txBody>
       </p:sp>
       <p:cxnSp>
         <p:nvCxnSpPr>
-          <p:cNvPr id="48" name="Conector: Angulado 47">
-            <a:extLst>
-              <a:ext uri="{FF2B5EF4-FFF2-40B4-BE49-F238E27FC236}">
-                <a16:creationId xmlns:a16="http://schemas.microsoft.com/office/drawing/2014/main" id="{731B7D95-9B62-C228-D08E-B8392D469D1C}"/>
+          <p:cNvPr id="29" name="Conector: Angulado 28">
+            <a:extLst>
+              <a:ext uri="{FF2B5EF4-FFF2-40B4-BE49-F238E27FC236}">
+                <a16:creationId xmlns:a16="http://schemas.microsoft.com/office/drawing/2014/main" id="{E0B98CCC-02CD-8825-729E-DE12E386DE84}"/>
               </a:ext>
             </a:extLst>
           </p:cNvPr>
           <p:cNvCxnSpPr>
             <a:cxnSpLocks/>
-            <a:stCxn id="45" idx="1"/>
-            <a:endCxn id="24" idx="2"/>
+            <a:stCxn id="27" idx="1"/>
+            <a:endCxn id="45" idx="2"/>
           </p:cNvCxnSpPr>
           <p:nvPr/>
         </p:nvCxnSpPr>
         <p:spPr>
-          <a:xfrm rot="10800000">
-            <a:off x="3501908" y="3083089"/>
-            <a:ext cx="732172" cy="1574337"/>
-          </a:xfrm>
-          <a:prstGeom prst="bentConnector2">
-            <a:avLst/>
+          <a:xfrm rot="10800000" flipH="1">
+            <a:off x="5415129" y="4452319"/>
+            <a:ext cx="190421" cy="1095826"/>
+          </a:xfrm>
+          <a:prstGeom prst="bentConnector4">
+            <a:avLst>
+              <a:gd name="adj1" fmla="val -273714"/>
+              <a:gd name="adj2" fmla="val 62763"/>
+            </a:avLst>
           </a:prstGeom>
           <a:ln>
             <a:tailEnd type="triangle"/>
@@ -5190,28 +5340,28 @@
       </p:cxnSp>
       <p:cxnSp>
         <p:nvCxnSpPr>
-          <p:cNvPr id="54" name="Conector: Angulado 53">
-            <a:extLst>
-              <a:ext uri="{FF2B5EF4-FFF2-40B4-BE49-F238E27FC236}">
-                <a16:creationId xmlns:a16="http://schemas.microsoft.com/office/drawing/2014/main" id="{24D64D20-E17C-49EE-9A87-7CE778700DD5}"/>
+          <p:cNvPr id="32" name="Conector: Angulado 31">
+            <a:extLst>
+              <a:ext uri="{FF2B5EF4-FFF2-40B4-BE49-F238E27FC236}">
+                <a16:creationId xmlns:a16="http://schemas.microsoft.com/office/drawing/2014/main" id="{53DF6409-939F-51FC-FEE9-4F56CEBAB90B}"/>
               </a:ext>
             </a:extLst>
           </p:cNvPr>
           <p:cNvCxnSpPr>
             <a:cxnSpLocks/>
-            <a:stCxn id="42" idx="3"/>
-            <a:endCxn id="45" idx="3"/>
+            <a:stCxn id="4" idx="6"/>
+            <a:endCxn id="9" idx="1"/>
           </p:cNvCxnSpPr>
           <p:nvPr/>
         </p:nvCxnSpPr>
         <p:spPr>
-          <a:xfrm flipH="1">
-            <a:off x="5379047" y="2711967"/>
-            <a:ext cx="2770192" cy="1945458"/>
+          <a:xfrm>
+            <a:off x="1086047" y="3083088"/>
+            <a:ext cx="1843378" cy="2111474"/>
           </a:xfrm>
           <a:prstGeom prst="bentConnector3">
             <a:avLst>
-              <a:gd name="adj1" fmla="val -8252"/>
+              <a:gd name="adj1" fmla="val 50000"/>
             </a:avLst>
           </a:prstGeom>
           <a:ln>
@@ -5235,29 +5385,467 @@
       </p:cxnSp>
       <p:cxnSp>
         <p:nvCxnSpPr>
-          <p:cNvPr id="59" name="Conector: Angulado 58">
-            <a:extLst>
-              <a:ext uri="{FF2B5EF4-FFF2-40B4-BE49-F238E27FC236}">
-                <a16:creationId xmlns:a16="http://schemas.microsoft.com/office/drawing/2014/main" id="{42BE5A8A-3A85-937E-CC9E-9C3EAD0F780F}"/>
+          <p:cNvPr id="40" name="Conector: Angulado 39">
+            <a:extLst>
+              <a:ext uri="{FF2B5EF4-FFF2-40B4-BE49-F238E27FC236}">
+                <a16:creationId xmlns:a16="http://schemas.microsoft.com/office/drawing/2014/main" id="{2C8CC96D-90AA-14D0-3838-CBE1CCCEA028}"/>
               </a:ext>
             </a:extLst>
           </p:cNvPr>
           <p:cNvCxnSpPr>
             <a:cxnSpLocks/>
-            <a:stCxn id="4" idx="6"/>
-            <a:endCxn id="24" idx="1"/>
+            <a:stCxn id="11" idx="5"/>
+            <a:endCxn id="42" idx="0"/>
           </p:cNvCxnSpPr>
           <p:nvPr/>
         </p:nvCxnSpPr>
         <p:spPr>
+          <a:xfrm>
+            <a:off x="5895590" y="2714558"/>
+            <a:ext cx="3193718" cy="992307"/>
+          </a:xfrm>
+          <a:prstGeom prst="bentConnector2">
+            <a:avLst/>
+          </a:prstGeom>
+          <a:ln>
+            <a:tailEnd type="triangle"/>
+          </a:ln>
+        </p:spPr>
+        <p:style>
+          <a:lnRef idx="2">
+            <a:schemeClr val="accent1"/>
+          </a:lnRef>
+          <a:fillRef idx="0">
+            <a:schemeClr val="accent1"/>
+          </a:fillRef>
+          <a:effectRef idx="1">
+            <a:schemeClr val="accent1"/>
+          </a:effectRef>
+          <a:fontRef idx="minor">
+            <a:schemeClr val="tx1"/>
+          </a:fontRef>
+        </p:style>
+      </p:cxnSp>
+      <p:sp>
+        <p:nvSpPr>
+          <p:cNvPr id="47" name="Seta: Curva para a Direita 46">
+            <a:extLst>
+              <a:ext uri="{FF2B5EF4-FFF2-40B4-BE49-F238E27FC236}">
+                <a16:creationId xmlns:a16="http://schemas.microsoft.com/office/drawing/2014/main" id="{8A071BCC-F066-1368-0F46-8408B6698E67}"/>
+              </a:ext>
+            </a:extLst>
+          </p:cNvPr>
+          <p:cNvSpPr/>
+          <p:nvPr/>
+        </p:nvSpPr>
+        <p:spPr>
+          <a:xfrm>
+            <a:off x="5087608" y="3865877"/>
+            <a:ext cx="305344" cy="483507"/>
+          </a:xfrm>
+          <a:prstGeom prst="curvedRightArrow">
+            <a:avLst/>
+          </a:prstGeom>
+        </p:spPr>
+        <p:style>
+          <a:lnRef idx="2">
+            <a:schemeClr val="accent1">
+              <a:shade val="15000"/>
+            </a:schemeClr>
+          </a:lnRef>
+          <a:fillRef idx="1">
+            <a:schemeClr val="accent1"/>
+          </a:fillRef>
+          <a:effectRef idx="0">
+            <a:schemeClr val="accent1"/>
+          </a:effectRef>
+          <a:fontRef idx="minor">
+            <a:schemeClr val="lt1"/>
+          </a:fontRef>
+        </p:style>
+        <p:txBody>
+          <a:bodyPr rtlCol="0" anchor="ctr"/>
+          <a:lstStyle/>
+          <a:p>
+            <a:pPr algn="ctr"/>
+            <a:endParaRPr lang="pt-BR">
+              <a:solidFill>
+                <a:schemeClr val="tx1"/>
+              </a:solidFill>
+            </a:endParaRPr>
+          </a:p>
+        </p:txBody>
+      </p:sp>
+      <p:sp>
+        <p:nvSpPr>
+          <p:cNvPr id="50" name="Seta: Curva para a Direita 49">
+            <a:extLst>
+              <a:ext uri="{FF2B5EF4-FFF2-40B4-BE49-F238E27FC236}">
+                <a16:creationId xmlns:a16="http://schemas.microsoft.com/office/drawing/2014/main" id="{3C1762C6-FA6B-BAA5-4BB7-321ED84F06EE}"/>
+              </a:ext>
+            </a:extLst>
+          </p:cNvPr>
+          <p:cNvSpPr/>
+          <p:nvPr/>
+        </p:nvSpPr>
+        <p:spPr>
+          <a:xfrm flipH="1">
+            <a:off x="5825216" y="3865877"/>
+            <a:ext cx="305344" cy="483507"/>
+          </a:xfrm>
+          <a:prstGeom prst="curvedRightArrow">
+            <a:avLst/>
+          </a:prstGeom>
+        </p:spPr>
+        <p:style>
+          <a:lnRef idx="2">
+            <a:schemeClr val="accent1">
+              <a:shade val="15000"/>
+            </a:schemeClr>
+          </a:lnRef>
+          <a:fillRef idx="1">
+            <a:schemeClr val="accent1"/>
+          </a:fillRef>
+          <a:effectRef idx="0">
+            <a:schemeClr val="accent1"/>
+          </a:effectRef>
+          <a:fontRef idx="minor">
+            <a:schemeClr val="lt1"/>
+          </a:fontRef>
+        </p:style>
+        <p:txBody>
+          <a:bodyPr rtlCol="0" anchor="ctr"/>
+          <a:lstStyle/>
+          <a:p>
+            <a:pPr algn="ctr"/>
+            <a:endParaRPr lang="pt-BR">
+              <a:solidFill>
+                <a:schemeClr val="tx1"/>
+              </a:solidFill>
+            </a:endParaRPr>
+          </a:p>
+        </p:txBody>
+      </p:sp>
+      <p:cxnSp>
+        <p:nvCxnSpPr>
+          <p:cNvPr id="52" name="Conector de Seta Reta 51">
+            <a:extLst>
+              <a:ext uri="{FF2B5EF4-FFF2-40B4-BE49-F238E27FC236}">
+                <a16:creationId xmlns:a16="http://schemas.microsoft.com/office/drawing/2014/main" id="{001491EF-20F8-3AD1-131C-6B1890F5F474}"/>
+              </a:ext>
+            </a:extLst>
+          </p:cNvPr>
+          <p:cNvCxnSpPr>
+            <a:cxnSpLocks/>
+            <a:stCxn id="42" idx="1"/>
+            <a:endCxn id="45" idx="3"/>
+          </p:cNvCxnSpPr>
+          <p:nvPr/>
+        </p:nvCxnSpPr>
+        <p:spPr>
+          <a:xfrm flipH="1">
+            <a:off x="6178034" y="4077986"/>
+            <a:ext cx="2338790" cy="3212"/>
+          </a:xfrm>
+          <a:prstGeom prst="straightConnector1">
+            <a:avLst/>
+          </a:prstGeom>
+          <a:ln>
+            <a:tailEnd type="triangle"/>
+          </a:ln>
+        </p:spPr>
+        <p:style>
+          <a:lnRef idx="2">
+            <a:schemeClr val="accent1"/>
+          </a:lnRef>
+          <a:fillRef idx="0">
+            <a:schemeClr val="accent1"/>
+          </a:fillRef>
+          <a:effectRef idx="1">
+            <a:schemeClr val="accent1"/>
+          </a:effectRef>
+          <a:fontRef idx="minor">
+            <a:schemeClr val="tx1"/>
+          </a:fontRef>
+        </p:style>
+      </p:cxnSp>
+      <p:cxnSp>
+        <p:nvCxnSpPr>
+          <p:cNvPr id="56" name="Conector: Angulado 55">
+            <a:extLst>
+              <a:ext uri="{FF2B5EF4-FFF2-40B4-BE49-F238E27FC236}">
+                <a16:creationId xmlns:a16="http://schemas.microsoft.com/office/drawing/2014/main" id="{868A5CDA-FAF9-E465-C877-1282682B7BB9}"/>
+              </a:ext>
+            </a:extLst>
+          </p:cNvPr>
+          <p:cNvCxnSpPr>
+            <a:cxnSpLocks/>
+            <a:stCxn id="27" idx="5"/>
+            <a:endCxn id="42" idx="2"/>
+          </p:cNvCxnSpPr>
+          <p:nvPr/>
+        </p:nvCxnSpPr>
+        <p:spPr>
           <a:xfrm flipV="1">
-            <a:off x="1086047" y="2711967"/>
-            <a:ext cx="1843377" cy="371121"/>
+            <a:off x="5750222" y="4449107"/>
+            <a:ext cx="3339086" cy="1099038"/>
+          </a:xfrm>
+          <a:prstGeom prst="bentConnector2">
+            <a:avLst/>
+          </a:prstGeom>
+          <a:ln>
+            <a:tailEnd type="triangle"/>
+          </a:ln>
+        </p:spPr>
+        <p:style>
+          <a:lnRef idx="2">
+            <a:schemeClr val="accent1"/>
+          </a:lnRef>
+          <a:fillRef idx="0">
+            <a:schemeClr val="accent1"/>
+          </a:fillRef>
+          <a:effectRef idx="1">
+            <a:schemeClr val="accent1"/>
+          </a:effectRef>
+          <a:fontRef idx="minor">
+            <a:schemeClr val="tx1"/>
+          </a:fontRef>
+        </p:style>
+      </p:cxnSp>
+      <p:sp>
+        <p:nvSpPr>
+          <p:cNvPr id="60" name="CaixaDeTexto 59">
+            <a:extLst>
+              <a:ext uri="{FF2B5EF4-FFF2-40B4-BE49-F238E27FC236}">
+                <a16:creationId xmlns:a16="http://schemas.microsoft.com/office/drawing/2014/main" id="{8C080E51-049D-CCF9-527B-4DE24A2F7034}"/>
+              </a:ext>
+            </a:extLst>
+          </p:cNvPr>
+          <p:cNvSpPr txBox="1"/>
+          <p:nvPr/>
+        </p:nvSpPr>
+        <p:spPr>
+          <a:xfrm>
+            <a:off x="5688896" y="5351087"/>
+            <a:ext cx="399232" cy="230832"/>
+          </a:xfrm>
+          <a:prstGeom prst="rect">
+            <a:avLst/>
+          </a:prstGeom>
+          <a:noFill/>
+        </p:spPr>
+        <p:txBody>
+          <a:bodyPr wrap="square" rtlCol="0">
+            <a:spAutoFit/>
+          </a:bodyPr>
+          <a:lstStyle/>
+          <a:p>
+            <a:pPr algn="ctr"/>
+            <a:r>
+              <a:rPr lang="pt-BR" sz="900" dirty="0">
+                <a:latin typeface="Calibri" panose="020F0502020204030204" pitchFamily="34" charset="0"/>
+              </a:rPr>
+              <a:t>sim</a:t>
+            </a:r>
+          </a:p>
+        </p:txBody>
+      </p:sp>
+      <p:sp>
+        <p:nvSpPr>
+          <p:cNvPr id="63" name="CaixaDeTexto 62">
+            <a:extLst>
+              <a:ext uri="{FF2B5EF4-FFF2-40B4-BE49-F238E27FC236}">
+                <a16:creationId xmlns:a16="http://schemas.microsoft.com/office/drawing/2014/main" id="{7BD808EF-25AF-6A24-D082-C889F6D8220F}"/>
+              </a:ext>
+            </a:extLst>
+          </p:cNvPr>
+          <p:cNvSpPr txBox="1"/>
+          <p:nvPr/>
+        </p:nvSpPr>
+        <p:spPr>
+          <a:xfrm>
+            <a:off x="5033067" y="5321702"/>
+            <a:ext cx="399232" cy="230832"/>
+          </a:xfrm>
+          <a:prstGeom prst="rect">
+            <a:avLst/>
+          </a:prstGeom>
+          <a:noFill/>
+        </p:spPr>
+        <p:txBody>
+          <a:bodyPr wrap="square" rtlCol="0">
+            <a:spAutoFit/>
+          </a:bodyPr>
+          <a:lstStyle/>
+          <a:p>
+            <a:pPr algn="ctr"/>
+            <a:r>
+              <a:rPr lang="pt-BR" sz="900" dirty="0">
+                <a:latin typeface="Calibri" panose="020F0502020204030204" pitchFamily="34" charset="0"/>
+              </a:rPr>
+              <a:t>não</a:t>
+            </a:r>
+          </a:p>
+        </p:txBody>
+      </p:sp>
+      <p:cxnSp>
+        <p:nvCxnSpPr>
+          <p:cNvPr id="64" name="Conector: Angulado 63">
+            <a:extLst>
+              <a:ext uri="{FF2B5EF4-FFF2-40B4-BE49-F238E27FC236}">
+                <a16:creationId xmlns:a16="http://schemas.microsoft.com/office/drawing/2014/main" id="{DF3C0F43-2AF4-8222-DBE3-B0EA951A01E1}"/>
+              </a:ext>
+            </a:extLst>
+          </p:cNvPr>
+          <p:cNvCxnSpPr>
+            <a:cxnSpLocks/>
+            <a:stCxn id="9" idx="2"/>
+            <a:endCxn id="27" idx="3"/>
+          </p:cNvCxnSpPr>
+          <p:nvPr/>
+        </p:nvCxnSpPr>
+        <p:spPr>
+          <a:xfrm rot="16200000" flipH="1">
+            <a:off x="4411207" y="4656384"/>
+            <a:ext cx="262171" cy="2080767"/>
           </a:xfrm>
           <a:prstGeom prst="bentConnector3">
             <a:avLst>
-              <a:gd name="adj1" fmla="val 50000"/>
+              <a:gd name="adj1" fmla="val 333683"/>
             </a:avLst>
+          </a:prstGeom>
+          <a:ln>
+            <a:tailEnd type="triangle"/>
+          </a:ln>
+        </p:spPr>
+        <p:style>
+          <a:lnRef idx="2">
+            <a:schemeClr val="accent1"/>
+          </a:lnRef>
+          <a:fillRef idx="0">
+            <a:schemeClr val="accent1"/>
+          </a:fillRef>
+          <a:effectRef idx="1">
+            <a:schemeClr val="accent1"/>
+          </a:effectRef>
+          <a:fontRef idx="minor">
+            <a:schemeClr val="tx1"/>
+          </a:fontRef>
+        </p:style>
+      </p:cxnSp>
+      <p:sp>
+        <p:nvSpPr>
+          <p:cNvPr id="68" name="Elipse 67">
+            <a:extLst>
+              <a:ext uri="{FF2B5EF4-FFF2-40B4-BE49-F238E27FC236}">
+                <a16:creationId xmlns:a16="http://schemas.microsoft.com/office/drawing/2014/main" id="{D335CFCC-A9E3-97DA-B1BF-03F91885FAFF}"/>
+              </a:ext>
+            </a:extLst>
+          </p:cNvPr>
+          <p:cNvSpPr/>
+          <p:nvPr/>
+        </p:nvSpPr>
+        <p:spPr>
+          <a:xfrm>
+            <a:off x="11105953" y="3589024"/>
+            <a:ext cx="935919" cy="1025934"/>
+          </a:xfrm>
+          <a:prstGeom prst="ellipse">
+            <a:avLst/>
+          </a:prstGeom>
+          <a:solidFill>
+            <a:srgbClr val="C00000"/>
+          </a:solidFill>
+        </p:spPr>
+        <p:style>
+          <a:lnRef idx="2">
+            <a:schemeClr val="accent1">
+              <a:shade val="15000"/>
+            </a:schemeClr>
+          </a:lnRef>
+          <a:fillRef idx="1">
+            <a:schemeClr val="accent1"/>
+          </a:fillRef>
+          <a:effectRef idx="0">
+            <a:schemeClr val="accent1"/>
+          </a:effectRef>
+          <a:fontRef idx="minor">
+            <a:schemeClr val="lt1"/>
+          </a:fontRef>
+        </p:style>
+        <p:txBody>
+          <a:bodyPr rtlCol="0" anchor="ctr"/>
+          <a:lstStyle/>
+          <a:p>
+            <a:pPr algn="ctr"/>
+            <a:r>
+              <a:rPr lang="pt-BR" sz="800" dirty="0"/>
+              <a:t>FIM</a:t>
+            </a:r>
+          </a:p>
+        </p:txBody>
+      </p:sp>
+      <p:sp>
+        <p:nvSpPr>
+          <p:cNvPr id="69" name="CaixaDeTexto 68">
+            <a:extLst>
+              <a:ext uri="{FF2B5EF4-FFF2-40B4-BE49-F238E27FC236}">
+                <a16:creationId xmlns:a16="http://schemas.microsoft.com/office/drawing/2014/main" id="{21D1DFD8-60FD-471F-B93D-6BAE7849924B}"/>
+              </a:ext>
+            </a:extLst>
+          </p:cNvPr>
+          <p:cNvSpPr txBox="1"/>
+          <p:nvPr/>
+        </p:nvSpPr>
+        <p:spPr>
+          <a:xfrm>
+            <a:off x="9960986" y="3751050"/>
+            <a:ext cx="993219" cy="369332"/>
+          </a:xfrm>
+          <a:prstGeom prst="rect">
+            <a:avLst/>
+          </a:prstGeom>
+          <a:noFill/>
+        </p:spPr>
+        <p:txBody>
+          <a:bodyPr wrap="square" rtlCol="0">
+            <a:spAutoFit/>
+          </a:bodyPr>
+          <a:lstStyle/>
+          <a:p>
+            <a:pPr algn="ctr"/>
+            <a:r>
+              <a:rPr lang="pt-BR" sz="900" dirty="0">
+                <a:latin typeface="Calibri" panose="020F0502020204030204" pitchFamily="34" charset="0"/>
+              </a:rPr>
+              <a:t>Encerrar a execução</a:t>
+            </a:r>
+          </a:p>
+        </p:txBody>
+      </p:sp>
+      <p:cxnSp>
+        <p:nvCxnSpPr>
+          <p:cNvPr id="70" name="Conector de Seta Reta 69">
+            <a:extLst>
+              <a:ext uri="{FF2B5EF4-FFF2-40B4-BE49-F238E27FC236}">
+                <a16:creationId xmlns:a16="http://schemas.microsoft.com/office/drawing/2014/main" id="{87271B2C-5F28-FEE6-180B-491AA4BC652E}"/>
+              </a:ext>
+            </a:extLst>
+          </p:cNvPr>
+          <p:cNvCxnSpPr>
+            <a:cxnSpLocks/>
+            <a:stCxn id="42" idx="3"/>
+            <a:endCxn id="68" idx="2"/>
+          </p:cNvCxnSpPr>
+          <p:nvPr/>
+        </p:nvCxnSpPr>
+        <p:spPr>
+          <a:xfrm>
+            <a:off x="9661791" y="4077986"/>
+            <a:ext cx="1444162" cy="24005"/>
+          </a:xfrm>
+          <a:prstGeom prst="straightConnector1">
+            <a:avLst/>
           </a:prstGeom>
           <a:ln>
             <a:tailEnd type="triangle"/>

</xml_diff>